<commit_message>
fixed unicode errors and improved text file formatting
</commit_message>
<xml_diff>
--- a/output/hymns/Blessed-Assurance.pptx
+++ b/output/hymns/Blessed-Assurance.pptx
@@ -3780,11 +3780,11 @@
               <a:defRPr sz="2500"/>
             </a:pPr>
             <a:r>
-              <a:t>Blessed assurance, Jesus is mine! </a:t>
+              <a:t>Blessed assurance, Jesus is mine!</a:t>
             </a:r>
             <a:br/>
             <a:r>
-              <a:t>O what a foretaste of glory divine! </a:t>
+              <a:t>O what a foretaste of glory divine!</a:t>
             </a:r>
             <a:br/>
             <a:r>
@@ -3990,7 +3990,7 @@
             </a:r>
             <a:br/>
             <a:r>
-              <a:t>Angels descending bring from above </a:t>
+              <a:t>Angels descending bring from above</a:t>
             </a:r>
             <a:br/>
             <a:r>
@@ -4085,7 +4085,7 @@
               <a:defRPr sz="2500"/>
             </a:pPr>
             <a:r>
-              <a:t>Perfect submission, all is at rest </a:t>
+              <a:t>Perfect submission, all is at rest</a:t>
             </a:r>
             <a:br/>
             <a:r>

</xml_diff>